<commit_message>
presentatie sprint 1 en afstreep versie gemaakt
</commit_message>
<xml_diff>
--- a/documentatie/scrum presentaties/sprint 1.pptx
+++ b/documentatie/scrum presentaties/sprint 1.pptx
@@ -7,10 +7,11 @@
   <p:sldIdLst>
     <p:sldId id="256" r:id="rId2"/>
     <p:sldId id="257" r:id="rId3"/>
-    <p:sldId id="258" r:id="rId4"/>
-    <p:sldId id="259" r:id="rId5"/>
-    <p:sldId id="260" r:id="rId6"/>
-    <p:sldId id="261" r:id="rId7"/>
+    <p:sldId id="262" r:id="rId4"/>
+    <p:sldId id="258" r:id="rId5"/>
+    <p:sldId id="259" r:id="rId6"/>
+    <p:sldId id="260" r:id="rId7"/>
+    <p:sldId id="261" r:id="rId8"/>
   </p:sldIdLst>
   <p:sldSz cx="12192000" cy="6858000"/>
   <p:notesSz cx="6858000" cy="9144000"/>
@@ -109,6 +110,11 @@
       </a:defRPr>
     </a:lvl9pPr>
   </p:defaultTextStyle>
+  <p:extLst>
+    <p:ext uri="{EFAFB233-063F-42B5-8137-9DF3F51BA10A}">
+      <p15:sldGuideLst xmlns:p15="http://schemas.microsoft.com/office/powerpoint/2012/main"/>
+    </p:ext>
+  </p:extLst>
 </p:presentation>
 </file>
 
@@ -857,7 +863,7 @@
           <a:p>
             <a:fld id="{08FAC342-9467-4EF1-BE59-841E266529DF}" type="datetimeFigureOut">
               <a:rPr lang="nl-NL" smtClean="0"/>
-              <a:t>19-9-2025</a:t>
+              <a:t>23-9-2025</a:t>
             </a:fld>
             <a:endParaRPr lang="nl-NL"/>
           </a:p>
@@ -1108,7 +1114,7 @@
           <a:p>
             <a:fld id="{08FAC342-9467-4EF1-BE59-841E266529DF}" type="datetimeFigureOut">
               <a:rPr lang="nl-NL" smtClean="0"/>
-              <a:t>19-9-2025</a:t>
+              <a:t>23-9-2025</a:t>
             </a:fld>
             <a:endParaRPr lang="nl-NL"/>
           </a:p>
@@ -1422,7 +1428,7 @@
           <a:p>
             <a:fld id="{08FAC342-9467-4EF1-BE59-841E266529DF}" type="datetimeFigureOut">
               <a:rPr lang="nl-NL" smtClean="0"/>
-              <a:t>19-9-2025</a:t>
+              <a:t>23-9-2025</a:t>
             </a:fld>
             <a:endParaRPr lang="nl-NL"/>
           </a:p>
@@ -1755,7 +1761,7 @@
           <a:p>
             <a:fld id="{08FAC342-9467-4EF1-BE59-841E266529DF}" type="datetimeFigureOut">
               <a:rPr lang="nl-NL" smtClean="0"/>
-              <a:t>19-9-2025</a:t>
+              <a:t>23-9-2025</a:t>
             </a:fld>
             <a:endParaRPr lang="nl-NL"/>
           </a:p>
@@ -2069,7 +2075,7 @@
           <a:p>
             <a:fld id="{08FAC342-9467-4EF1-BE59-841E266529DF}" type="datetimeFigureOut">
               <a:rPr lang="nl-NL" smtClean="0"/>
-              <a:t>19-9-2025</a:t>
+              <a:t>23-9-2025</a:t>
             </a:fld>
             <a:endParaRPr lang="nl-NL"/>
           </a:p>
@@ -2462,7 +2468,7 @@
           <a:p>
             <a:fld id="{08FAC342-9467-4EF1-BE59-841E266529DF}" type="datetimeFigureOut">
               <a:rPr lang="nl-NL" smtClean="0"/>
-              <a:t>19-9-2025</a:t>
+              <a:t>23-9-2025</a:t>
             </a:fld>
             <a:endParaRPr lang="nl-NL"/>
           </a:p>
@@ -2632,7 +2638,7 @@
           <a:p>
             <a:fld id="{08FAC342-9467-4EF1-BE59-841E266529DF}" type="datetimeFigureOut">
               <a:rPr lang="nl-NL" smtClean="0"/>
-              <a:t>19-9-2025</a:t>
+              <a:t>23-9-2025</a:t>
             </a:fld>
             <a:endParaRPr lang="nl-NL"/>
           </a:p>
@@ -2812,7 +2818,7 @@
           <a:p>
             <a:fld id="{08FAC342-9467-4EF1-BE59-841E266529DF}" type="datetimeFigureOut">
               <a:rPr lang="nl-NL" smtClean="0"/>
-              <a:t>19-9-2025</a:t>
+              <a:t>23-9-2025</a:t>
             </a:fld>
             <a:endParaRPr lang="nl-NL"/>
           </a:p>
@@ -2982,7 +2988,7 @@
           <a:p>
             <a:fld id="{08FAC342-9467-4EF1-BE59-841E266529DF}" type="datetimeFigureOut">
               <a:rPr lang="nl-NL" smtClean="0"/>
-              <a:t>19-9-2025</a:t>
+              <a:t>23-9-2025</a:t>
             </a:fld>
             <a:endParaRPr lang="nl-NL"/>
           </a:p>
@@ -3229,7 +3235,7 @@
           <a:p>
             <a:fld id="{08FAC342-9467-4EF1-BE59-841E266529DF}" type="datetimeFigureOut">
               <a:rPr lang="nl-NL" smtClean="0"/>
-              <a:t>19-9-2025</a:t>
+              <a:t>23-9-2025</a:t>
             </a:fld>
             <a:endParaRPr lang="nl-NL"/>
           </a:p>
@@ -3461,7 +3467,7 @@
           <a:p>
             <a:fld id="{08FAC342-9467-4EF1-BE59-841E266529DF}" type="datetimeFigureOut">
               <a:rPr lang="nl-NL" smtClean="0"/>
-              <a:t>19-9-2025</a:t>
+              <a:t>23-9-2025</a:t>
             </a:fld>
             <a:endParaRPr lang="nl-NL"/>
           </a:p>
@@ -3835,7 +3841,7 @@
           <a:p>
             <a:fld id="{08FAC342-9467-4EF1-BE59-841E266529DF}" type="datetimeFigureOut">
               <a:rPr lang="nl-NL" smtClean="0"/>
-              <a:t>19-9-2025</a:t>
+              <a:t>23-9-2025</a:t>
             </a:fld>
             <a:endParaRPr lang="nl-NL"/>
           </a:p>
@@ -3958,7 +3964,7 @@
           <a:p>
             <a:fld id="{08FAC342-9467-4EF1-BE59-841E266529DF}" type="datetimeFigureOut">
               <a:rPr lang="nl-NL" smtClean="0"/>
-              <a:t>19-9-2025</a:t>
+              <a:t>23-9-2025</a:t>
             </a:fld>
             <a:endParaRPr lang="nl-NL"/>
           </a:p>
@@ -4053,7 +4059,7 @@
           <a:p>
             <a:fld id="{08FAC342-9467-4EF1-BE59-841E266529DF}" type="datetimeFigureOut">
               <a:rPr lang="nl-NL" smtClean="0"/>
-              <a:t>19-9-2025</a:t>
+              <a:t>23-9-2025</a:t>
             </a:fld>
             <a:endParaRPr lang="nl-NL"/>
           </a:p>
@@ -4308,7 +4314,7 @@
           <a:p>
             <a:fld id="{08FAC342-9467-4EF1-BE59-841E266529DF}" type="datetimeFigureOut">
               <a:rPr lang="nl-NL" smtClean="0"/>
-              <a:t>19-9-2025</a:t>
+              <a:t>23-9-2025</a:t>
             </a:fld>
             <a:endParaRPr lang="nl-NL"/>
           </a:p>
@@ -4613,7 +4619,7 @@
           <a:p>
             <a:fld id="{08FAC342-9467-4EF1-BE59-841E266529DF}" type="datetimeFigureOut">
               <a:rPr lang="nl-NL" smtClean="0"/>
-              <a:t>19-9-2025</a:t>
+              <a:t>23-9-2025</a:t>
             </a:fld>
             <a:endParaRPr lang="nl-NL"/>
           </a:p>
@@ -5315,7 +5321,7 @@
           <a:p>
             <a:fld id="{08FAC342-9467-4EF1-BE59-841E266529DF}" type="datetimeFigureOut">
               <a:rPr lang="nl-NL" smtClean="0"/>
-              <a:t>19-9-2025</a:t>
+              <a:t>23-9-2025</a:t>
             </a:fld>
             <a:endParaRPr lang="nl-NL"/>
           </a:p>
@@ -6016,16 +6022,19 @@
           <a:lstStyle/>
           <a:p>
             <a:r>
-              <a:rPr lang="en-US" dirty="0"/>
-              <a:t>O</a:t>
+              <a:rPr lang="nl-NL" dirty="0"/>
+              <a:t>Gesprek met de product </a:t>
             </a:r>
             <a:r>
               <a:rPr lang="nl-NL" dirty="0" err="1"/>
-              <a:t>nderzoek</a:t>
-            </a:r>
+              <a:t>owner</a:t>
+            </a:r>
+            <a:endParaRPr lang="nl-NL" dirty="0"/>
+          </a:p>
+          <a:p>
             <a:r>
               <a:rPr lang="nl-NL" dirty="0"/>
-              <a:t> naar sensoren</a:t>
+              <a:t>Onderzoek naar sensoren</a:t>
             </a:r>
           </a:p>
           <a:p>
@@ -6090,6 +6099,910 @@
           <a:chExt cx="0" cy="0"/>
         </a:xfrm>
       </p:grpSpPr>
+      <p:pic>
+        <p:nvPicPr>
+          <p:cNvPr id="5" name="Tijdelijke aanduiding voor inhoud 4" descr="Afbeelding met buitenshuis, gebouw, meer, water&#10;&#10;Door AI gegenereerde inhoud is mogelijk onjuist.">
+            <a:extLst>
+              <a:ext uri="{FF2B5EF4-FFF2-40B4-BE49-F238E27FC236}">
+                <a16:creationId xmlns:a16="http://schemas.microsoft.com/office/drawing/2014/main" id="{BB94B75D-87A4-DFA8-DB72-0AA0B49EE814}"/>
+              </a:ext>
+            </a:extLst>
+          </p:cNvPr>
+          <p:cNvPicPr>
+            <a:picLocks noChangeAspect="1"/>
+          </p:cNvPicPr>
+          <p:nvPr/>
+        </p:nvPicPr>
+        <p:blipFill>
+          <a:blip r:embed="rId2">
+            <a:extLst>
+              <a:ext uri="{28A0092B-C50C-407E-A947-70E740481C1C}">
+                <a14:useLocalDpi xmlns:a14="http://schemas.microsoft.com/office/drawing/2010/main" val="0"/>
+              </a:ext>
+            </a:extLst>
+          </a:blip>
+          <a:srcRect l="13362"/>
+          <a:stretch>
+            <a:fillRect/>
+          </a:stretch>
+        </p:blipFill>
+        <p:spPr>
+          <a:xfrm>
+            <a:off x="4269854" y="-1"/>
+            <a:ext cx="7922146" cy="6858001"/>
+          </a:xfrm>
+          <a:custGeom>
+            <a:avLst/>
+            <a:gdLst/>
+            <a:ahLst/>
+            <a:cxnLst/>
+            <a:rect l="l" t="t" r="r" b="b"/>
+            <a:pathLst>
+              <a:path w="7922146" h="6858001">
+                <a:moveTo>
+                  <a:pt x="379987" y="0"/>
+                </a:moveTo>
+                <a:lnTo>
+                  <a:pt x="5304971" y="0"/>
+                </a:lnTo>
+                <a:lnTo>
+                  <a:pt x="7065281" y="0"/>
+                </a:lnTo>
+                <a:lnTo>
+                  <a:pt x="7397540" y="0"/>
+                </a:lnTo>
+                <a:lnTo>
+                  <a:pt x="7397540" y="1"/>
+                </a:lnTo>
+                <a:lnTo>
+                  <a:pt x="7922146" y="1"/>
+                </a:lnTo>
+                <a:lnTo>
+                  <a:pt x="7922146" y="6858001"/>
+                </a:lnTo>
+                <a:lnTo>
+                  <a:pt x="7065281" y="6858001"/>
+                </a:lnTo>
+                <a:lnTo>
+                  <a:pt x="7065281" y="6858000"/>
+                </a:lnTo>
+                <a:lnTo>
+                  <a:pt x="5932989" y="6858000"/>
+                </a:lnTo>
+                <a:lnTo>
+                  <a:pt x="5932989" y="6858001"/>
+                </a:lnTo>
+                <a:lnTo>
+                  <a:pt x="27809" y="6858001"/>
+                </a:lnTo>
+                <a:lnTo>
+                  <a:pt x="1803228" y="4521201"/>
+                </a:lnTo>
+                <a:close/>
+                <a:moveTo>
+                  <a:pt x="0" y="0"/>
+                </a:moveTo>
+                <a:lnTo>
+                  <a:pt x="379987" y="0"/>
+                </a:lnTo>
+                <a:lnTo>
+                  <a:pt x="0" y="407"/>
+                </a:lnTo>
+                <a:close/>
+              </a:path>
+            </a:pathLst>
+          </a:custGeom>
+        </p:spPr>
+      </p:pic>
+      <p:sp>
+        <p:nvSpPr>
+          <p:cNvPr id="2" name="Titel 1">
+            <a:extLst>
+              <a:ext uri="{FF2B5EF4-FFF2-40B4-BE49-F238E27FC236}">
+                <a16:creationId xmlns:a16="http://schemas.microsoft.com/office/drawing/2014/main" id="{A33DC8E8-02C7-CA06-DC51-1668982B78E7}"/>
+              </a:ext>
+            </a:extLst>
+          </p:cNvPr>
+          <p:cNvSpPr>
+            <a:spLocks noGrp="1"/>
+          </p:cNvSpPr>
+          <p:nvPr>
+            <p:ph type="title"/>
+          </p:nvPr>
+        </p:nvSpPr>
+        <p:spPr>
+          <a:xfrm>
+            <a:off x="677333" y="609600"/>
+            <a:ext cx="3851123" cy="1320800"/>
+          </a:xfrm>
+        </p:spPr>
+        <p:txBody>
+          <a:bodyPr>
+            <a:normAutofit/>
+          </a:bodyPr>
+          <a:lstStyle/>
+          <a:p>
+            <a:r>
+              <a:rPr lang="en-US" dirty="0" err="1"/>
+              <a:t>Gesprek</a:t>
+            </a:r>
+            <a:r>
+              <a:rPr lang="en-US" dirty="0"/>
+              <a:t> met product owner</a:t>
+            </a:r>
+            <a:endParaRPr lang="nl-NL" dirty="0"/>
+          </a:p>
+        </p:txBody>
+      </p:sp>
+      <p:sp>
+        <p:nvSpPr>
+          <p:cNvPr id="9" name="Content Placeholder 8">
+            <a:extLst>
+              <a:ext uri="{FF2B5EF4-FFF2-40B4-BE49-F238E27FC236}">
+                <a16:creationId xmlns:a16="http://schemas.microsoft.com/office/drawing/2014/main" id="{0DA4438D-7104-8BA3-6B01-D81D3D9D99FD}"/>
+              </a:ext>
+            </a:extLst>
+          </p:cNvPr>
+          <p:cNvSpPr>
+            <a:spLocks noGrp="1"/>
+          </p:cNvSpPr>
+          <p:nvPr>
+            <p:ph idx="1"/>
+          </p:nvPr>
+        </p:nvSpPr>
+        <p:spPr>
+          <a:xfrm>
+            <a:off x="677334" y="2160589"/>
+            <a:ext cx="3851122" cy="3880773"/>
+          </a:xfrm>
+        </p:spPr>
+        <p:txBody>
+          <a:bodyPr>
+            <a:normAutofit/>
+          </a:bodyPr>
+          <a:lstStyle/>
+          <a:p>
+            <a:r>
+              <a:rPr lang="en-US" dirty="0" err="1"/>
+              <a:t>Uitleg</a:t>
+            </a:r>
+            <a:r>
+              <a:rPr lang="en-US" dirty="0"/>
+              <a:t> </a:t>
+            </a:r>
+            <a:r>
+              <a:rPr lang="en-US" dirty="0" err="1"/>
+              <a:t>gekregen</a:t>
+            </a:r>
+            <a:r>
+              <a:rPr lang="en-US" dirty="0"/>
+              <a:t> over hoe het system </a:t>
+            </a:r>
+            <a:r>
+              <a:rPr lang="en-US" dirty="0" err="1"/>
+              <a:t>werkt</a:t>
+            </a:r>
+            <a:endParaRPr lang="en-US" dirty="0"/>
+          </a:p>
+          <a:p>
+            <a:endParaRPr lang="en-US" dirty="0"/>
+          </a:p>
+        </p:txBody>
+      </p:sp>
+      <p:cxnSp>
+        <p:nvCxnSpPr>
+          <p:cNvPr id="14" name="Straight Connector 13">
+            <a:extLst>
+              <a:ext uri="{FF2B5EF4-FFF2-40B4-BE49-F238E27FC236}">
+                <a16:creationId xmlns:a16="http://schemas.microsoft.com/office/drawing/2014/main" id="{64FA5DFF-7FE6-4855-84E6-DFA78EE978BD}"/>
+              </a:ext>
+              <a:ext uri="{C183D7F6-B498-43B3-948B-1728B52AA6E4}">
+                <adec:decorative xmlns:adec="http://schemas.microsoft.com/office/drawing/2017/decorative" val="1"/>
+              </a:ext>
+            </a:extLst>
+          </p:cNvPr>
+          <p:cNvCxnSpPr>
+            <a:cxnSpLocks noGrp="1" noRot="1" noChangeAspect="1" noMove="1" noResize="1" noEditPoints="1" noAdjustHandles="1" noChangeArrowheads="1" noChangeShapeType="1"/>
+          </p:cNvCxnSpPr>
+          <p:nvPr>
+            <p:extLst>
+              <p:ext uri="{386F3935-93C4-4BCD-93E2-E3B085C9AB24}">
+                <p16:designElem xmlns:p16="http://schemas.microsoft.com/office/powerpoint/2015/main" val="1"/>
+              </p:ext>
+            </p:extLst>
+          </p:nvPr>
+        </p:nvCxnSpPr>
+        <p:spPr>
+          <a:xfrm>
+            <a:off x="9371012" y="0"/>
+            <a:ext cx="1219200" cy="6858000"/>
+          </a:xfrm>
+          <a:prstGeom prst="line">
+            <a:avLst/>
+          </a:prstGeom>
+          <a:ln w="9525">
+            <a:solidFill>
+              <a:schemeClr val="bg1">
+                <a:lumMod val="75000"/>
+              </a:schemeClr>
+            </a:solidFill>
+          </a:ln>
+        </p:spPr>
+        <p:style>
+          <a:lnRef idx="2">
+            <a:schemeClr val="accent1"/>
+          </a:lnRef>
+          <a:fillRef idx="0">
+            <a:schemeClr val="accent1"/>
+          </a:fillRef>
+          <a:effectRef idx="1">
+            <a:schemeClr val="accent1"/>
+          </a:effectRef>
+          <a:fontRef idx="minor">
+            <a:schemeClr val="tx1"/>
+          </a:fontRef>
+        </p:style>
+      </p:cxnSp>
+      <p:cxnSp>
+        <p:nvCxnSpPr>
+          <p:cNvPr id="16" name="Straight Connector 15">
+            <a:extLst>
+              <a:ext uri="{FF2B5EF4-FFF2-40B4-BE49-F238E27FC236}">
+                <a16:creationId xmlns:a16="http://schemas.microsoft.com/office/drawing/2014/main" id="{2AFD8CBA-54A3-4363-991B-B9C631BBFA74}"/>
+              </a:ext>
+              <a:ext uri="{C183D7F6-B498-43B3-948B-1728B52AA6E4}">
+                <adec:decorative xmlns:adec="http://schemas.microsoft.com/office/drawing/2017/decorative" val="1"/>
+              </a:ext>
+            </a:extLst>
+          </p:cNvPr>
+          <p:cNvCxnSpPr>
+            <a:cxnSpLocks noGrp="1" noRot="1" noChangeAspect="1" noMove="1" noResize="1" noEditPoints="1" noAdjustHandles="1" noChangeArrowheads="1" noChangeShapeType="1"/>
+          </p:cNvCxnSpPr>
+          <p:nvPr>
+            <p:extLst>
+              <p:ext uri="{386F3935-93C4-4BCD-93E2-E3B085C9AB24}">
+                <p16:designElem xmlns:p16="http://schemas.microsoft.com/office/powerpoint/2015/main" val="1"/>
+              </p:ext>
+            </p:extLst>
+          </p:nvPr>
+        </p:nvCxnSpPr>
+        <p:spPr>
+          <a:xfrm flipH="1">
+            <a:off x="7425267" y="3681413"/>
+            <a:ext cx="4763558" cy="3176587"/>
+          </a:xfrm>
+          <a:prstGeom prst="line">
+            <a:avLst/>
+          </a:prstGeom>
+          <a:ln w="9525">
+            <a:solidFill>
+              <a:schemeClr val="bg1">
+                <a:lumMod val="85000"/>
+              </a:schemeClr>
+            </a:solidFill>
+          </a:ln>
+        </p:spPr>
+        <p:style>
+          <a:lnRef idx="2">
+            <a:schemeClr val="accent1"/>
+          </a:lnRef>
+          <a:fillRef idx="0">
+            <a:schemeClr val="accent1"/>
+          </a:fillRef>
+          <a:effectRef idx="1">
+            <a:schemeClr val="accent1"/>
+          </a:effectRef>
+          <a:fontRef idx="minor">
+            <a:schemeClr val="tx1"/>
+          </a:fontRef>
+        </p:style>
+      </p:cxnSp>
+      <p:sp>
+        <p:nvSpPr>
+          <p:cNvPr id="18" name="Rectangle 23">
+            <a:extLst>
+              <a:ext uri="{FF2B5EF4-FFF2-40B4-BE49-F238E27FC236}">
+                <a16:creationId xmlns:a16="http://schemas.microsoft.com/office/drawing/2014/main" id="{3F088236-D655-4F88-B238-E16762358025}"/>
+              </a:ext>
+              <a:ext uri="{C183D7F6-B498-43B3-948B-1728B52AA6E4}">
+                <adec:decorative xmlns:adec="http://schemas.microsoft.com/office/drawing/2017/decorative" val="1"/>
+              </a:ext>
+            </a:extLst>
+          </p:cNvPr>
+          <p:cNvSpPr>
+            <a:spLocks noGrp="1" noRot="1" noChangeAspect="1" noMove="1" noResize="1" noEditPoints="1" noAdjustHandles="1" noChangeArrowheads="1" noChangeShapeType="1" noTextEdit="1"/>
+          </p:cNvSpPr>
+          <p:nvPr>
+            <p:extLst>
+              <p:ext uri="{386F3935-93C4-4BCD-93E2-E3B085C9AB24}">
+                <p16:designElem xmlns:p16="http://schemas.microsoft.com/office/powerpoint/2015/main" val="1"/>
+              </p:ext>
+            </p:extLst>
+          </p:nvPr>
+        </p:nvSpPr>
+        <p:spPr>
+          <a:xfrm>
+            <a:off x="9181476" y="-8467"/>
+            <a:ext cx="3007349" cy="6866467"/>
+          </a:xfrm>
+          <a:custGeom>
+            <a:avLst/>
+            <a:gdLst/>
+            <a:ahLst/>
+            <a:cxnLst/>
+            <a:rect l="l" t="t" r="r" b="b"/>
+            <a:pathLst>
+              <a:path w="3007349" h="6866467">
+                <a:moveTo>
+                  <a:pt x="2045532" y="0"/>
+                </a:moveTo>
+                <a:lnTo>
+                  <a:pt x="3007349" y="0"/>
+                </a:lnTo>
+                <a:lnTo>
+                  <a:pt x="3007349" y="6866467"/>
+                </a:lnTo>
+                <a:lnTo>
+                  <a:pt x="0" y="6866467"/>
+                </a:lnTo>
+                <a:lnTo>
+                  <a:pt x="2045532" y="0"/>
+                </a:lnTo>
+                <a:close/>
+              </a:path>
+            </a:pathLst>
+          </a:custGeom>
+          <a:solidFill>
+            <a:schemeClr val="accent1">
+              <a:alpha val="30000"/>
+            </a:schemeClr>
+          </a:solidFill>
+          <a:ln>
+            <a:noFill/>
+          </a:ln>
+          <a:effectLst/>
+        </p:spPr>
+        <p:style>
+          <a:lnRef idx="1">
+            <a:schemeClr val="accent1"/>
+          </a:lnRef>
+          <a:fillRef idx="3">
+            <a:schemeClr val="accent1"/>
+          </a:fillRef>
+          <a:effectRef idx="2">
+            <a:schemeClr val="accent1"/>
+          </a:effectRef>
+          <a:fontRef idx="minor">
+            <a:schemeClr val="lt1"/>
+          </a:fontRef>
+        </p:style>
+        <p:txBody>
+          <a:bodyPr/>
+          <a:lstStyle/>
+          <a:p>
+            <a:endParaRPr lang="nl-NL"/>
+          </a:p>
+        </p:txBody>
+      </p:sp>
+      <p:sp>
+        <p:nvSpPr>
+          <p:cNvPr id="20" name="Rectangle 25">
+            <a:extLst>
+              <a:ext uri="{FF2B5EF4-FFF2-40B4-BE49-F238E27FC236}">
+                <a16:creationId xmlns:a16="http://schemas.microsoft.com/office/drawing/2014/main" id="{3DAC0C92-199E-475C-9390-119A9B027276}"/>
+              </a:ext>
+              <a:ext uri="{C183D7F6-B498-43B3-948B-1728B52AA6E4}">
+                <adec:decorative xmlns:adec="http://schemas.microsoft.com/office/drawing/2017/decorative" val="1"/>
+              </a:ext>
+            </a:extLst>
+          </p:cNvPr>
+          <p:cNvSpPr>
+            <a:spLocks noGrp="1" noRot="1" noChangeAspect="1" noMove="1" noResize="1" noEditPoints="1" noAdjustHandles="1" noChangeArrowheads="1" noChangeShapeType="1" noTextEdit="1"/>
+          </p:cNvSpPr>
+          <p:nvPr>
+            <p:extLst>
+              <p:ext uri="{386F3935-93C4-4BCD-93E2-E3B085C9AB24}">
+                <p16:designElem xmlns:p16="http://schemas.microsoft.com/office/powerpoint/2015/main" val="1"/>
+              </p:ext>
+            </p:extLst>
+          </p:nvPr>
+        </p:nvSpPr>
+        <p:spPr>
+          <a:xfrm>
+            <a:off x="9603442" y="-8467"/>
+            <a:ext cx="2588558" cy="6866467"/>
+          </a:xfrm>
+          <a:custGeom>
+            <a:avLst/>
+            <a:gdLst/>
+            <a:ahLst/>
+            <a:cxnLst/>
+            <a:rect l="l" t="t" r="r" b="b"/>
+            <a:pathLst>
+              <a:path w="2573311" h="6866467">
+                <a:moveTo>
+                  <a:pt x="0" y="0"/>
+                </a:moveTo>
+                <a:lnTo>
+                  <a:pt x="2573311" y="0"/>
+                </a:lnTo>
+                <a:lnTo>
+                  <a:pt x="2573311" y="6866467"/>
+                </a:lnTo>
+                <a:lnTo>
+                  <a:pt x="1202336" y="6866467"/>
+                </a:lnTo>
+                <a:lnTo>
+                  <a:pt x="0" y="0"/>
+                </a:lnTo>
+                <a:close/>
+              </a:path>
+            </a:pathLst>
+          </a:custGeom>
+          <a:solidFill>
+            <a:schemeClr val="accent1">
+              <a:alpha val="20000"/>
+            </a:schemeClr>
+          </a:solidFill>
+          <a:ln>
+            <a:noFill/>
+          </a:ln>
+          <a:effectLst/>
+        </p:spPr>
+        <p:style>
+          <a:lnRef idx="1">
+            <a:schemeClr val="accent1"/>
+          </a:lnRef>
+          <a:fillRef idx="3">
+            <a:schemeClr val="accent1"/>
+          </a:fillRef>
+          <a:effectRef idx="2">
+            <a:schemeClr val="accent1"/>
+          </a:effectRef>
+          <a:fontRef idx="minor">
+            <a:schemeClr val="lt1"/>
+          </a:fontRef>
+        </p:style>
+        <p:txBody>
+          <a:bodyPr/>
+          <a:lstStyle/>
+          <a:p>
+            <a:endParaRPr lang="nl-NL"/>
+          </a:p>
+        </p:txBody>
+      </p:sp>
+      <p:sp>
+        <p:nvSpPr>
+          <p:cNvPr id="22" name="Isosceles Triangle 24">
+            <a:extLst>
+              <a:ext uri="{FF2B5EF4-FFF2-40B4-BE49-F238E27FC236}">
+                <a16:creationId xmlns:a16="http://schemas.microsoft.com/office/drawing/2014/main" id="{C4CFB339-0ED8-4FE2-9EF1-6D1375B8499B}"/>
+              </a:ext>
+              <a:ext uri="{C183D7F6-B498-43B3-948B-1728B52AA6E4}">
+                <adec:decorative xmlns:adec="http://schemas.microsoft.com/office/drawing/2017/decorative" val="1"/>
+              </a:ext>
+            </a:extLst>
+          </p:cNvPr>
+          <p:cNvSpPr>
+            <a:spLocks noGrp="1" noRot="1" noChangeAspect="1" noMove="1" noResize="1" noEditPoints="1" noAdjustHandles="1" noChangeArrowheads="1" noChangeShapeType="1" noTextEdit="1"/>
+          </p:cNvSpPr>
+          <p:nvPr>
+            <p:extLst>
+              <p:ext uri="{386F3935-93C4-4BCD-93E2-E3B085C9AB24}">
+                <p16:designElem xmlns:p16="http://schemas.microsoft.com/office/powerpoint/2015/main" val="1"/>
+              </p:ext>
+            </p:extLst>
+          </p:nvPr>
+        </p:nvSpPr>
+        <p:spPr>
+          <a:xfrm>
+            <a:off x="8932333" y="3048000"/>
+            <a:ext cx="3259667" cy="3810000"/>
+          </a:xfrm>
+          <a:prstGeom prst="triangle">
+            <a:avLst>
+              <a:gd name="adj" fmla="val 100000"/>
+            </a:avLst>
+          </a:prstGeom>
+          <a:solidFill>
+            <a:schemeClr val="accent2">
+              <a:alpha val="72000"/>
+            </a:schemeClr>
+          </a:solidFill>
+          <a:ln>
+            <a:noFill/>
+          </a:ln>
+          <a:effectLst/>
+        </p:spPr>
+        <p:style>
+          <a:lnRef idx="1">
+            <a:schemeClr val="accent1"/>
+          </a:lnRef>
+          <a:fillRef idx="3">
+            <a:schemeClr val="accent1"/>
+          </a:fillRef>
+          <a:effectRef idx="2">
+            <a:schemeClr val="accent1"/>
+          </a:effectRef>
+          <a:fontRef idx="minor">
+            <a:schemeClr val="lt1"/>
+          </a:fontRef>
+        </p:style>
+        <p:txBody>
+          <a:bodyPr/>
+          <a:lstStyle/>
+          <a:p>
+            <a:endParaRPr lang="nl-NL"/>
+          </a:p>
+        </p:txBody>
+      </p:sp>
+      <p:sp>
+        <p:nvSpPr>
+          <p:cNvPr id="24" name="Rectangle 27">
+            <a:extLst>
+              <a:ext uri="{FF2B5EF4-FFF2-40B4-BE49-F238E27FC236}">
+                <a16:creationId xmlns:a16="http://schemas.microsoft.com/office/drawing/2014/main" id="{31896C80-2069-4431-9C19-83B913734490}"/>
+              </a:ext>
+              <a:ext uri="{C183D7F6-B498-43B3-948B-1728B52AA6E4}">
+                <adec:decorative xmlns:adec="http://schemas.microsoft.com/office/drawing/2017/decorative" val="1"/>
+              </a:ext>
+            </a:extLst>
+          </p:cNvPr>
+          <p:cNvSpPr>
+            <a:spLocks noGrp="1" noRot="1" noChangeAspect="1" noMove="1" noResize="1" noEditPoints="1" noAdjustHandles="1" noChangeArrowheads="1" noChangeShapeType="1" noTextEdit="1"/>
+          </p:cNvSpPr>
+          <p:nvPr>
+            <p:extLst>
+              <p:ext uri="{386F3935-93C4-4BCD-93E2-E3B085C9AB24}">
+                <p16:designElem xmlns:p16="http://schemas.microsoft.com/office/powerpoint/2015/main" val="1"/>
+              </p:ext>
+            </p:extLst>
+          </p:nvPr>
+        </p:nvSpPr>
+        <p:spPr>
+          <a:xfrm>
+            <a:off x="9334500" y="-8467"/>
+            <a:ext cx="2854326" cy="6866467"/>
+          </a:xfrm>
+          <a:custGeom>
+            <a:avLst/>
+            <a:gdLst/>
+            <a:ahLst/>
+            <a:cxnLst/>
+            <a:rect l="l" t="t" r="r" b="b"/>
+            <a:pathLst>
+              <a:path w="2858013" h="6866467">
+                <a:moveTo>
+                  <a:pt x="0" y="0"/>
+                </a:moveTo>
+                <a:lnTo>
+                  <a:pt x="2858013" y="0"/>
+                </a:lnTo>
+                <a:lnTo>
+                  <a:pt x="2858013" y="6866467"/>
+                </a:lnTo>
+                <a:lnTo>
+                  <a:pt x="2473942" y="6866467"/>
+                </a:lnTo>
+                <a:lnTo>
+                  <a:pt x="0" y="0"/>
+                </a:lnTo>
+                <a:close/>
+              </a:path>
+            </a:pathLst>
+          </a:custGeom>
+          <a:solidFill>
+            <a:schemeClr val="accent2">
+              <a:lumMod val="75000"/>
+              <a:alpha val="47000"/>
+            </a:schemeClr>
+          </a:solidFill>
+          <a:ln>
+            <a:noFill/>
+          </a:ln>
+          <a:effectLst/>
+        </p:spPr>
+        <p:style>
+          <a:lnRef idx="1">
+            <a:schemeClr val="accent1"/>
+          </a:lnRef>
+          <a:fillRef idx="3">
+            <a:schemeClr val="accent1"/>
+          </a:fillRef>
+          <a:effectRef idx="2">
+            <a:schemeClr val="accent1"/>
+          </a:effectRef>
+          <a:fontRef idx="minor">
+            <a:schemeClr val="lt1"/>
+          </a:fontRef>
+        </p:style>
+        <p:txBody>
+          <a:bodyPr/>
+          <a:lstStyle/>
+          <a:p>
+            <a:endParaRPr lang="nl-NL"/>
+          </a:p>
+        </p:txBody>
+      </p:sp>
+      <p:sp>
+        <p:nvSpPr>
+          <p:cNvPr id="26" name="Rectangle 28">
+            <a:extLst>
+              <a:ext uri="{FF2B5EF4-FFF2-40B4-BE49-F238E27FC236}">
+                <a16:creationId xmlns:a16="http://schemas.microsoft.com/office/drawing/2014/main" id="{BF120A21-0841-4823-B0C4-28AEBCEF9B78}"/>
+              </a:ext>
+              <a:ext uri="{C183D7F6-B498-43B3-948B-1728B52AA6E4}">
+                <adec:decorative xmlns:adec="http://schemas.microsoft.com/office/drawing/2017/decorative" val="1"/>
+              </a:ext>
+            </a:extLst>
+          </p:cNvPr>
+          <p:cNvSpPr>
+            <a:spLocks noGrp="1" noRot="1" noChangeAspect="1" noMove="1" noResize="1" noEditPoints="1" noAdjustHandles="1" noChangeArrowheads="1" noChangeShapeType="1" noTextEdit="1"/>
+          </p:cNvSpPr>
+          <p:nvPr>
+            <p:extLst>
+              <p:ext uri="{386F3935-93C4-4BCD-93E2-E3B085C9AB24}">
+                <p16:designElem xmlns:p16="http://schemas.microsoft.com/office/powerpoint/2015/main" val="1"/>
+              </p:ext>
+            </p:extLst>
+          </p:nvPr>
+        </p:nvSpPr>
+        <p:spPr>
+          <a:xfrm>
+            <a:off x="10898730" y="-8467"/>
+            <a:ext cx="1290094" cy="6866467"/>
+          </a:xfrm>
+          <a:custGeom>
+            <a:avLst/>
+            <a:gdLst/>
+            <a:ahLst/>
+            <a:cxnLst/>
+            <a:rect l="l" t="t" r="r" b="b"/>
+            <a:pathLst>
+              <a:path w="1290094" h="6858000">
+                <a:moveTo>
+                  <a:pt x="1019735" y="0"/>
+                </a:moveTo>
+                <a:lnTo>
+                  <a:pt x="1290094" y="0"/>
+                </a:lnTo>
+                <a:lnTo>
+                  <a:pt x="1290094" y="6858000"/>
+                </a:lnTo>
+                <a:lnTo>
+                  <a:pt x="0" y="6858000"/>
+                </a:lnTo>
+                <a:lnTo>
+                  <a:pt x="1019735" y="0"/>
+                </a:lnTo>
+                <a:close/>
+              </a:path>
+            </a:pathLst>
+          </a:custGeom>
+          <a:solidFill>
+            <a:schemeClr val="accent1">
+              <a:lumMod val="60000"/>
+              <a:lumOff val="40000"/>
+              <a:alpha val="70000"/>
+            </a:schemeClr>
+          </a:solidFill>
+          <a:ln>
+            <a:noFill/>
+          </a:ln>
+          <a:effectLst/>
+        </p:spPr>
+        <p:style>
+          <a:lnRef idx="1">
+            <a:schemeClr val="accent1"/>
+          </a:lnRef>
+          <a:fillRef idx="3">
+            <a:schemeClr val="accent1"/>
+          </a:fillRef>
+          <a:effectRef idx="2">
+            <a:schemeClr val="accent1"/>
+          </a:effectRef>
+          <a:fontRef idx="minor">
+            <a:schemeClr val="lt1"/>
+          </a:fontRef>
+        </p:style>
+        <p:txBody>
+          <a:bodyPr/>
+          <a:lstStyle/>
+          <a:p>
+            <a:endParaRPr lang="nl-NL"/>
+          </a:p>
+        </p:txBody>
+      </p:sp>
+      <p:sp>
+        <p:nvSpPr>
+          <p:cNvPr id="28" name="Rectangle 29">
+            <a:extLst>
+              <a:ext uri="{FF2B5EF4-FFF2-40B4-BE49-F238E27FC236}">
+                <a16:creationId xmlns:a16="http://schemas.microsoft.com/office/drawing/2014/main" id="{DBB05BAE-BBD3-4289-899F-A6851503C6B0}"/>
+              </a:ext>
+              <a:ext uri="{C183D7F6-B498-43B3-948B-1728B52AA6E4}">
+                <adec:decorative xmlns:adec="http://schemas.microsoft.com/office/drawing/2017/decorative" val="1"/>
+              </a:ext>
+            </a:extLst>
+          </p:cNvPr>
+          <p:cNvSpPr>
+            <a:spLocks noGrp="1" noRot="1" noChangeAspect="1" noMove="1" noResize="1" noEditPoints="1" noAdjustHandles="1" noChangeArrowheads="1" noChangeShapeType="1" noTextEdit="1"/>
+          </p:cNvSpPr>
+          <p:nvPr>
+            <p:extLst>
+              <p:ext uri="{386F3935-93C4-4BCD-93E2-E3B085C9AB24}">
+                <p16:designElem xmlns:p16="http://schemas.microsoft.com/office/powerpoint/2015/main" val="1"/>
+              </p:ext>
+            </p:extLst>
+          </p:nvPr>
+        </p:nvSpPr>
+        <p:spPr>
+          <a:xfrm>
+            <a:off x="10938999" y="-8467"/>
+            <a:ext cx="1249825" cy="6866467"/>
+          </a:xfrm>
+          <a:custGeom>
+            <a:avLst/>
+            <a:gdLst/>
+            <a:ahLst/>
+            <a:cxnLst/>
+            <a:rect l="l" t="t" r="r" b="b"/>
+            <a:pathLst>
+              <a:path w="1249825" h="6858000">
+                <a:moveTo>
+                  <a:pt x="0" y="0"/>
+                </a:moveTo>
+                <a:lnTo>
+                  <a:pt x="1249825" y="0"/>
+                </a:lnTo>
+                <a:lnTo>
+                  <a:pt x="1249825" y="6858000"/>
+                </a:lnTo>
+                <a:lnTo>
+                  <a:pt x="1109382" y="6858000"/>
+                </a:lnTo>
+                <a:lnTo>
+                  <a:pt x="0" y="0"/>
+                </a:lnTo>
+                <a:close/>
+              </a:path>
+            </a:pathLst>
+          </a:custGeom>
+          <a:solidFill>
+            <a:schemeClr val="accent1">
+              <a:alpha val="65000"/>
+            </a:schemeClr>
+          </a:solidFill>
+          <a:ln>
+            <a:noFill/>
+          </a:ln>
+          <a:effectLst/>
+        </p:spPr>
+        <p:style>
+          <a:lnRef idx="1">
+            <a:schemeClr val="accent1"/>
+          </a:lnRef>
+          <a:fillRef idx="3">
+            <a:schemeClr val="accent1"/>
+          </a:fillRef>
+          <a:effectRef idx="2">
+            <a:schemeClr val="accent1"/>
+          </a:effectRef>
+          <a:fontRef idx="minor">
+            <a:schemeClr val="lt1"/>
+          </a:fontRef>
+        </p:style>
+        <p:txBody>
+          <a:bodyPr/>
+          <a:lstStyle/>
+          <a:p>
+            <a:endParaRPr lang="nl-NL"/>
+          </a:p>
+        </p:txBody>
+      </p:sp>
+      <p:sp>
+        <p:nvSpPr>
+          <p:cNvPr id="30" name="Isosceles Triangle 29">
+            <a:extLst>
+              <a:ext uri="{FF2B5EF4-FFF2-40B4-BE49-F238E27FC236}">
+                <a16:creationId xmlns:a16="http://schemas.microsoft.com/office/drawing/2014/main" id="{9874D11C-36F5-4BBE-A490-019A54E953B0}"/>
+              </a:ext>
+              <a:ext uri="{C183D7F6-B498-43B3-948B-1728B52AA6E4}">
+                <adec:decorative xmlns:adec="http://schemas.microsoft.com/office/drawing/2017/decorative" val="1"/>
+              </a:ext>
+            </a:extLst>
+          </p:cNvPr>
+          <p:cNvSpPr>
+            <a:spLocks noGrp="1" noRot="1" noChangeAspect="1" noMove="1" noResize="1" noEditPoints="1" noAdjustHandles="1" noChangeArrowheads="1" noChangeShapeType="1" noTextEdit="1"/>
+          </p:cNvSpPr>
+          <p:nvPr>
+            <p:extLst>
+              <p:ext uri="{386F3935-93C4-4BCD-93E2-E3B085C9AB24}">
+                <p16:designElem xmlns:p16="http://schemas.microsoft.com/office/powerpoint/2015/main" val="1"/>
+              </p:ext>
+            </p:extLst>
+          </p:nvPr>
+        </p:nvSpPr>
+        <p:spPr>
+          <a:xfrm>
+            <a:off x="10371666" y="3589867"/>
+            <a:ext cx="1817159" cy="3268133"/>
+          </a:xfrm>
+          <a:prstGeom prst="triangle">
+            <a:avLst>
+              <a:gd name="adj" fmla="val 100000"/>
+            </a:avLst>
+          </a:prstGeom>
+          <a:solidFill>
+            <a:schemeClr val="accent1">
+              <a:alpha val="80000"/>
+            </a:schemeClr>
+          </a:solidFill>
+          <a:ln>
+            <a:noFill/>
+          </a:ln>
+          <a:effectLst/>
+        </p:spPr>
+        <p:style>
+          <a:lnRef idx="1">
+            <a:schemeClr val="accent1"/>
+          </a:lnRef>
+          <a:fillRef idx="3">
+            <a:schemeClr val="accent1"/>
+          </a:fillRef>
+          <a:effectRef idx="2">
+            <a:schemeClr val="accent1"/>
+          </a:effectRef>
+          <a:fontRef idx="minor">
+            <a:schemeClr val="lt1"/>
+          </a:fontRef>
+        </p:style>
+        <p:txBody>
+          <a:bodyPr/>
+          <a:lstStyle/>
+          <a:p>
+            <a:endParaRPr lang="nl-NL"/>
+          </a:p>
+        </p:txBody>
+      </p:sp>
+    </p:spTree>
+    <p:extLst>
+      <p:ext uri="{BB962C8B-B14F-4D97-AF65-F5344CB8AC3E}">
+        <p14:creationId xmlns:p14="http://schemas.microsoft.com/office/powerpoint/2010/main" val="2091788745"/>
+      </p:ext>
+    </p:extLst>
+  </p:cSld>
+  <p:clrMapOvr>
+    <a:masterClrMapping/>
+  </p:clrMapOvr>
+</p:sld>
+</file>
+
+<file path=ppt/slides/slide4.xml><?xml version="1.0" encoding="utf-8"?>
+<p:sld xmlns:a="http://schemas.openxmlformats.org/drawingml/2006/main" xmlns:r="http://schemas.openxmlformats.org/officeDocument/2006/relationships" xmlns:p="http://schemas.openxmlformats.org/presentationml/2006/main">
+  <p:cSld>
+    <p:bg>
+      <p:bgPr>
+        <a:solidFill>
+          <a:schemeClr val="bg1"/>
+        </a:solidFill>
+        <a:effectLst/>
+      </p:bgPr>
+    </p:bg>
+    <p:spTree>
+      <p:nvGrpSpPr>
+        <p:cNvPr id="1" name=""/>
+        <p:cNvGrpSpPr/>
+        <p:nvPr/>
+      </p:nvGrpSpPr>
+      <p:grpSpPr>
+        <a:xfrm>
+          <a:off x="0" y="0"/>
+          <a:ext cx="0" cy="0"/>
+          <a:chOff x="0" y="0"/>
+          <a:chExt cx="0" cy="0"/>
+        </a:xfrm>
+      </p:grpSpPr>
       <p:sp>
         <p:nvSpPr>
           <p:cNvPr id="2" name="Titel 1">
@@ -6144,7 +7057,7 @@
       </p:sp>
       <p:sp>
         <p:nvSpPr>
-          <p:cNvPr id="33" name="Isosceles Triangle 8">
+          <p:cNvPr id="38" name="Isosceles Triangle 8">
             <a:extLst>
               <a:ext uri="{FF2B5EF4-FFF2-40B4-BE49-F238E27FC236}">
                 <a16:creationId xmlns:a16="http://schemas.microsoft.com/office/drawing/2014/main" id="{E7038D70-4165-4B7C-81B1-689029C47D9F}"/>
@@ -6383,7 +7296,7 @@
         </p:blipFill>
         <p:spPr>
           <a:xfrm>
-            <a:off x="6129405" y="715493"/>
+            <a:off x="6129405" y="609600"/>
             <a:ext cx="3144597" cy="2601747"/>
           </a:xfrm>
           <a:prstGeom prst="rect">
@@ -6393,10 +7306,10 @@
       </p:pic>
       <p:pic>
         <p:nvPicPr>
-          <p:cNvPr id="6" name="drawing" descr="Anemometer / windsnelheidsmeter">
+          <p:cNvPr id="4" name="Afbeelding 3" descr="Afbeelding met gereedschap, Huishoudelijke ijzerwaren, overdekt, zwart-wit&#10;&#10;Door AI gegenereerde inhoud is mogelijk onjuist.">
             <a:extLst>
               <a:ext uri="{FF2B5EF4-FFF2-40B4-BE49-F238E27FC236}">
-                <a16:creationId xmlns:a16="http://schemas.microsoft.com/office/drawing/2014/main" id="{83B40DC0-6F21-328F-7BD5-F16484EAACDC}"/>
+                <a16:creationId xmlns:a16="http://schemas.microsoft.com/office/drawing/2014/main" id="{8119C939-0554-70CE-36DB-11C69AB1D617}"/>
               </a:ext>
             </a:extLst>
           </p:cNvPr>
@@ -6409,11 +7322,11 @@
           <a:blip r:embed="rId3">
             <a:extLst>
               <a:ext uri="{28A0092B-C50C-407E-A947-70E740481C1C}">
-                <a14:useLocalDpi xmlns:a14="http://schemas.microsoft.com/office/drawing/2010/main"/>
+                <a14:useLocalDpi xmlns:a14="http://schemas.microsoft.com/office/drawing/2010/main" val="0"/>
               </a:ext>
             </a:extLst>
           </a:blip>
-          <a:srcRect t="11433" r="-6" b="5825"/>
+          <a:srcRect l="14583" r="4737" b="-4"/>
           <a:stretch>
             <a:fillRect/>
           </a:stretch>
@@ -6441,7 +7354,7 @@
 </p:sld>
 </file>
 
-<file path=ppt/slides/slide4.xml><?xml version="1.0" encoding="utf-8"?>
+<file path=ppt/slides/slide5.xml><?xml version="1.0" encoding="utf-8"?>
 <p:sld xmlns:a="http://schemas.openxmlformats.org/drawingml/2006/main" xmlns:r="http://schemas.openxmlformats.org/officeDocument/2006/relationships" xmlns:p="http://schemas.openxmlformats.org/presentationml/2006/main">
   <p:cSld>
     <p:bg>
@@ -6741,9 +7654,17 @@
 </p:sld>
 </file>
 
-<file path=ppt/slides/slide5.xml><?xml version="1.0" encoding="utf-8"?>
+<file path=ppt/slides/slide6.xml><?xml version="1.0" encoding="utf-8"?>
 <p:sld xmlns:a="http://schemas.openxmlformats.org/drawingml/2006/main" xmlns:r="http://schemas.openxmlformats.org/officeDocument/2006/relationships" xmlns:p="http://schemas.openxmlformats.org/presentationml/2006/main">
   <p:cSld>
+    <p:bg>
+      <p:bgPr>
+        <a:solidFill>
+          <a:schemeClr val="bg1"/>
+        </a:solidFill>
+        <a:effectLst/>
+      </p:bgPr>
+    </p:bg>
     <p:spTree>
       <p:nvGrpSpPr>
         <p:cNvPr id="1" name=""/>
@@ -6774,13 +7695,20 @@
             <p:ph type="title"/>
           </p:nvPr>
         </p:nvSpPr>
-        <p:spPr/>
-        <p:txBody>
-          <a:bodyPr/>
-          <a:lstStyle/>
-          <a:p>
-            <a:r>
-              <a:rPr lang="en-US" dirty="0"/>
+        <p:spPr>
+          <a:xfrm>
+            <a:off x="676746" y="609600"/>
+            <a:ext cx="3729076" cy="1320800"/>
+          </a:xfrm>
+        </p:spPr>
+        <p:txBody>
+          <a:bodyPr anchor="ctr">
+            <a:normAutofit/>
+          </a:bodyPr>
+          <a:lstStyle/>
+          <a:p>
+            <a:r>
+              <a:rPr lang="en-US"/>
               <a:t>Sprint 2</a:t>
             </a:r>
             <a:endParaRPr lang="nl-NL" dirty="0"/>
@@ -6803,15 +7731,645 @@
             <p:ph idx="1"/>
           </p:nvPr>
         </p:nvSpPr>
-        <p:spPr/>
-        <p:txBody>
-          <a:bodyPr/>
-          <a:lstStyle/>
-          <a:p>
-            <a:endParaRPr lang="nl-NL" dirty="0"/>
-          </a:p>
-        </p:txBody>
-      </p:sp>
+        <p:spPr>
+          <a:xfrm>
+            <a:off x="685167" y="2160589"/>
+            <a:ext cx="3720916" cy="3560733"/>
+          </a:xfrm>
+        </p:spPr>
+        <p:txBody>
+          <a:bodyPr>
+            <a:normAutofit/>
+          </a:bodyPr>
+          <a:lstStyle/>
+          <a:p>
+            <a:r>
+              <a:rPr lang="en-US" dirty="0" err="1"/>
+              <a:t>Langdurige</a:t>
+            </a:r>
+            <a:r>
+              <a:rPr lang="en-US" dirty="0"/>
+              <a:t> planning </a:t>
+            </a:r>
+            <a:r>
+              <a:rPr lang="en-US" dirty="0" err="1"/>
+              <a:t>maken</a:t>
+            </a:r>
+            <a:endParaRPr lang="en-US" dirty="0"/>
+          </a:p>
+          <a:p>
+            <a:endParaRPr lang="en-US" dirty="0"/>
+          </a:p>
+          <a:p>
+            <a:endParaRPr lang="en-US" dirty="0"/>
+          </a:p>
+          <a:p>
+            <a:endParaRPr lang="en-US" dirty="0"/>
+          </a:p>
+          <a:p>
+            <a:pPr marL="0" indent="0">
+              <a:buNone/>
+            </a:pPr>
+            <a:endParaRPr lang="en-US" dirty="0"/>
+          </a:p>
+          <a:p>
+            <a:r>
+              <a:rPr lang="en-US" dirty="0"/>
+              <a:t>Als de </a:t>
+            </a:r>
+            <a:r>
+              <a:rPr lang="en-US" dirty="0" err="1"/>
+              <a:t>sensoren</a:t>
+            </a:r>
+            <a:r>
+              <a:rPr lang="en-US" dirty="0"/>
+              <a:t> </a:t>
+            </a:r>
+            <a:r>
+              <a:rPr lang="en-US" dirty="0" err="1"/>
+              <a:t>binnen</a:t>
+            </a:r>
+            <a:r>
+              <a:rPr lang="en-US" dirty="0"/>
+              <a:t> </a:t>
+            </a:r>
+            <a:r>
+              <a:rPr lang="en-US" dirty="0" err="1"/>
+              <a:t>zijn</a:t>
+            </a:r>
+            <a:r>
+              <a:rPr lang="en-US" dirty="0"/>
+              <a:t>:</a:t>
+            </a:r>
+          </a:p>
+          <a:p>
+            <a:endParaRPr lang="en-US" dirty="0"/>
+          </a:p>
+        </p:txBody>
+      </p:sp>
+      <p:graphicFrame>
+        <p:nvGraphicFramePr>
+          <p:cNvPr id="6" name="Tabel 5">
+            <a:extLst>
+              <a:ext uri="{FF2B5EF4-FFF2-40B4-BE49-F238E27FC236}">
+                <a16:creationId xmlns:a16="http://schemas.microsoft.com/office/drawing/2014/main" id="{51D553B3-EACE-EF01-E458-E561A7BA70C9}"/>
+              </a:ext>
+            </a:extLst>
+          </p:cNvPr>
+          <p:cNvGraphicFramePr>
+            <a:graphicFrameLocks noGrp="1"/>
+          </p:cNvGraphicFramePr>
+          <p:nvPr>
+            <p:extLst>
+              <p:ext uri="{D42A27DB-BD31-4B8C-83A1-F6EECF244321}">
+                <p14:modId xmlns:p14="http://schemas.microsoft.com/office/powerpoint/2010/main" val="1025669380"/>
+              </p:ext>
+            </p:extLst>
+          </p:nvPr>
+        </p:nvGraphicFramePr>
+        <p:xfrm>
+          <a:off x="4645613" y="899249"/>
+          <a:ext cx="6861220" cy="5649983"/>
+        </p:xfrm>
+        <a:graphic>
+          <a:graphicData uri="http://schemas.openxmlformats.org/drawingml/2006/table">
+            <a:tbl>
+              <a:tblPr firstRow="1" bandRow="1">
+                <a:tableStyleId>{5C22544A-7EE6-4342-B048-85BDC9FD1C3A}</a:tableStyleId>
+              </a:tblPr>
+              <a:tblGrid>
+                <a:gridCol w="3538891">
+                  <a:extLst>
+                    <a:ext uri="{9D8B030D-6E8A-4147-A177-3AD203B41FA5}">
+                      <a16:colId xmlns:a16="http://schemas.microsoft.com/office/drawing/2014/main" val="4067886319"/>
+                    </a:ext>
+                  </a:extLst>
+                </a:gridCol>
+                <a:gridCol w="3322329">
+                  <a:extLst>
+                    <a:ext uri="{9D8B030D-6E8A-4147-A177-3AD203B41FA5}">
+                      <a16:colId xmlns:a16="http://schemas.microsoft.com/office/drawing/2014/main" val="660744966"/>
+                    </a:ext>
+                  </a:extLst>
+                </a:gridCol>
+              </a:tblGrid>
+              <a:tr h="349540">
+                <a:tc>
+                  <a:txBody>
+                    <a:bodyPr/>
+                    <a:lstStyle/>
+                    <a:p>
+                      <a:r>
+                        <a:rPr lang="en-US" sz="1200"/>
+                        <a:t>User story</a:t>
+                      </a:r>
+                      <a:endParaRPr lang="nl-NL" sz="1200"/>
+                    </a:p>
+                  </a:txBody>
+                  <a:tcPr marL="61529" marR="61529" marT="30765" marB="30765"/>
+                </a:tc>
+                <a:tc>
+                  <a:txBody>
+                    <a:bodyPr/>
+                    <a:lstStyle/>
+                    <a:p>
+                      <a:r>
+                        <a:rPr lang="en-US" sz="1200"/>
+                        <a:t>taken</a:t>
+                      </a:r>
+                      <a:endParaRPr lang="nl-NL" sz="1200"/>
+                    </a:p>
+                  </a:txBody>
+                  <a:tcPr marL="61529" marR="61529" marT="30765" marB="30765"/>
+                </a:tc>
+                <a:extLst>
+                  <a:ext uri="{0D108BD9-81ED-4DB2-BD59-A6C34878D82A}">
+                    <a16:rowId xmlns:a16="http://schemas.microsoft.com/office/drawing/2014/main" val="3999946025"/>
+                  </a:ext>
+                </a:extLst>
+              </a:tr>
+              <a:tr h="1064509">
+                <a:tc>
+                  <a:txBody>
+                    <a:bodyPr/>
+                    <a:lstStyle/>
+                    <a:p>
+                      <a:pPr marL="0" marR="0" lvl="0" indent="0" algn="l" defTabSz="457200" rtl="0" eaLnBrk="1" fontAlgn="auto" latinLnBrk="0" hangingPunct="1">
+                        <a:lnSpc>
+                          <a:spcPct val="100000"/>
+                        </a:lnSpc>
+                        <a:spcBef>
+                          <a:spcPts val="0"/>
+                        </a:spcBef>
+                        <a:spcAft>
+                          <a:spcPts val="0"/>
+                        </a:spcAft>
+                        <a:buClrTx/>
+                        <a:buSzTx/>
+                        <a:buFontTx/>
+                        <a:buNone/>
+                        <a:tabLst/>
+                        <a:defRPr/>
+                      </a:pPr>
+                      <a:r>
+                        <a:rPr lang="en-US" sz="1600" b="1" dirty="0"/>
+                        <a:t>10. </a:t>
+                      </a:r>
+                      <a:r>
+                        <a:rPr lang="nl-NL" sz="1600" b="1" kern="1200" dirty="0">
+                          <a:solidFill>
+                            <a:schemeClr val="dk1"/>
+                          </a:solidFill>
+                          <a:effectLst/>
+                          <a:latin typeface="+mn-lt"/>
+                          <a:ea typeface="+mn-ea"/>
+                          <a:cs typeface="+mn-cs"/>
+                        </a:rPr>
+                        <a:t>Ik wil dat de microcontroller de motor kan aansturen op basis van de data.</a:t>
+                      </a:r>
+                    </a:p>
+                    <a:p>
+                      <a:endParaRPr lang="nl-NL" sz="1600" b="1" dirty="0"/>
+                    </a:p>
+                  </a:txBody>
+                  <a:tcPr marL="61529" marR="61529" marT="30765" marB="30765"/>
+                </a:tc>
+                <a:tc>
+                  <a:txBody>
+                    <a:bodyPr/>
+                    <a:lstStyle/>
+                    <a:p>
+                      <a:pPr marL="0" marR="0" lvl="0" indent="0" algn="l" defTabSz="457200" rtl="0" eaLnBrk="1" fontAlgn="auto" latinLnBrk="0" hangingPunct="1">
+                        <a:lnSpc>
+                          <a:spcPct val="100000"/>
+                        </a:lnSpc>
+                        <a:spcBef>
+                          <a:spcPts val="0"/>
+                        </a:spcBef>
+                        <a:spcAft>
+                          <a:spcPts val="0"/>
+                        </a:spcAft>
+                        <a:buClrTx/>
+                        <a:buSzTx/>
+                        <a:buFontTx/>
+                        <a:buNone/>
+                        <a:tabLst/>
+                        <a:defRPr/>
+                      </a:pPr>
+                      <a:r>
+                        <a:rPr lang="nl-NL" sz="1600" b="1" kern="1200" dirty="0">
+                          <a:solidFill>
+                            <a:schemeClr val="dk1"/>
+                          </a:solidFill>
+                          <a:effectLst/>
+                          <a:latin typeface="+mn-lt"/>
+                          <a:ea typeface="+mn-ea"/>
+                          <a:cs typeface="+mn-cs"/>
+                        </a:rPr>
+                        <a:t>10.1/12.1 Bestudeer de verkregen motorprestatiegegevens</a:t>
+                      </a:r>
+                    </a:p>
+                    <a:p>
+                      <a:endParaRPr lang="nl-NL" sz="1600" b="1" dirty="0"/>
+                    </a:p>
+                  </a:txBody>
+                  <a:tcPr marL="61529" marR="61529" marT="30765" marB="30765"/>
+                </a:tc>
+                <a:extLst>
+                  <a:ext uri="{0D108BD9-81ED-4DB2-BD59-A6C34878D82A}">
+                    <a16:rowId xmlns:a16="http://schemas.microsoft.com/office/drawing/2014/main" val="944690521"/>
+                  </a:ext>
+                </a:extLst>
+              </a:tr>
+              <a:tr h="1064509">
+                <a:tc>
+                  <a:txBody>
+                    <a:bodyPr/>
+                    <a:lstStyle/>
+                    <a:p>
+                      <a:pPr marL="0" marR="0" lvl="0" indent="0" algn="l" defTabSz="457200" rtl="0" eaLnBrk="1" fontAlgn="auto" latinLnBrk="0" hangingPunct="1">
+                        <a:lnSpc>
+                          <a:spcPct val="100000"/>
+                        </a:lnSpc>
+                        <a:spcBef>
+                          <a:spcPts val="0"/>
+                        </a:spcBef>
+                        <a:spcAft>
+                          <a:spcPts val="0"/>
+                        </a:spcAft>
+                        <a:buClrTx/>
+                        <a:buSzTx/>
+                        <a:buFontTx/>
+                        <a:buNone/>
+                        <a:tabLst/>
+                        <a:defRPr/>
+                      </a:pPr>
+                      <a:r>
+                        <a:rPr lang="en-US" sz="1600" b="1" dirty="0"/>
+                        <a:t>15. </a:t>
+                      </a:r>
+                      <a:r>
+                        <a:rPr lang="nl-NL" sz="1600" b="1" kern="1200" dirty="0">
+                          <a:solidFill>
+                            <a:schemeClr val="dk1"/>
+                          </a:solidFill>
+                          <a:effectLst/>
+                          <a:latin typeface="+mn-lt"/>
+                          <a:ea typeface="+mn-ea"/>
+                          <a:cs typeface="+mn-cs"/>
+                        </a:rPr>
+                        <a:t>Ik wil de het weerstation altijd werkt ook al heeft hij geen stroomtoevoer.</a:t>
+                      </a:r>
+                    </a:p>
+                    <a:p>
+                      <a:endParaRPr lang="nl-NL" sz="1600" b="1" dirty="0"/>
+                    </a:p>
+                  </a:txBody>
+                  <a:tcPr marL="61529" marR="61529" marT="30765" marB="30765"/>
+                </a:tc>
+                <a:tc>
+                  <a:txBody>
+                    <a:bodyPr/>
+                    <a:lstStyle/>
+                    <a:p>
+                      <a:pPr marL="0" marR="0" lvl="0" indent="0" algn="l" defTabSz="457200" rtl="0" eaLnBrk="1" fontAlgn="auto" latinLnBrk="0" hangingPunct="1">
+                        <a:lnSpc>
+                          <a:spcPct val="100000"/>
+                        </a:lnSpc>
+                        <a:spcBef>
+                          <a:spcPts val="0"/>
+                        </a:spcBef>
+                        <a:spcAft>
+                          <a:spcPts val="0"/>
+                        </a:spcAft>
+                        <a:buClrTx/>
+                        <a:buSzTx/>
+                        <a:buFontTx/>
+                        <a:buNone/>
+                        <a:tabLst/>
+                        <a:defRPr/>
+                      </a:pPr>
+                      <a:r>
+                        <a:rPr lang="nl-NL" sz="1600" b="1" kern="1200" dirty="0">
+                          <a:solidFill>
+                            <a:schemeClr val="dk1"/>
+                          </a:solidFill>
+                          <a:effectLst/>
+                          <a:latin typeface="+mn-lt"/>
+                          <a:ea typeface="+mn-ea"/>
+                          <a:cs typeface="+mn-cs"/>
+                        </a:rPr>
+                        <a:t>15.1 Onderzoek wat is de opties van zelfvoorziening.</a:t>
+                      </a:r>
+                    </a:p>
+                    <a:p>
+                      <a:endParaRPr lang="nl-NL" sz="1600" b="1" dirty="0"/>
+                    </a:p>
+                  </a:txBody>
+                  <a:tcPr marL="61529" marR="61529" marT="30765" marB="30765"/>
+                </a:tc>
+                <a:extLst>
+                  <a:ext uri="{0D108BD9-81ED-4DB2-BD59-A6C34878D82A}">
+                    <a16:rowId xmlns:a16="http://schemas.microsoft.com/office/drawing/2014/main" val="2322170192"/>
+                  </a:ext>
+                </a:extLst>
+              </a:tr>
+              <a:tr h="826186">
+                <a:tc>
+                  <a:txBody>
+                    <a:bodyPr/>
+                    <a:lstStyle/>
+                    <a:p>
+                      <a:r>
+                        <a:rPr lang="en-US" sz="1600" b="1"/>
+                        <a:t>14. </a:t>
+                      </a:r>
+                      <a:r>
+                        <a:rPr lang="nl-NL" sz="1600" b="1" kern="1200">
+                          <a:solidFill>
+                            <a:schemeClr val="dk1"/>
+                          </a:solidFill>
+                          <a:effectLst/>
+                          <a:latin typeface="+mn-lt"/>
+                          <a:ea typeface="+mn-ea"/>
+                          <a:cs typeface="+mn-cs"/>
+                        </a:rPr>
+                        <a:t>Ik wil in noodgevallen de motor van afstand kunnen aansturen of uitzetten.</a:t>
+                      </a:r>
+                      <a:endParaRPr lang="nl-NL" sz="1600" b="1"/>
+                    </a:p>
+                  </a:txBody>
+                  <a:tcPr marL="61529" marR="61529" marT="30765" marB="30765"/>
+                </a:tc>
+                <a:tc>
+                  <a:txBody>
+                    <a:bodyPr/>
+                    <a:lstStyle/>
+                    <a:p>
+                      <a:pPr marL="0" marR="0" lvl="0" indent="0" algn="l" defTabSz="457200" rtl="0" eaLnBrk="1" fontAlgn="auto" latinLnBrk="0" hangingPunct="1">
+                        <a:lnSpc>
+                          <a:spcPct val="100000"/>
+                        </a:lnSpc>
+                        <a:spcBef>
+                          <a:spcPts val="0"/>
+                        </a:spcBef>
+                        <a:spcAft>
+                          <a:spcPts val="0"/>
+                        </a:spcAft>
+                        <a:buClrTx/>
+                        <a:buSzTx/>
+                        <a:buFontTx/>
+                        <a:buNone/>
+                        <a:tabLst/>
+                        <a:defRPr/>
+                      </a:pPr>
+                      <a:r>
+                        <a:rPr lang="nl-NL" sz="1600" b="1" kern="1200">
+                          <a:solidFill>
+                            <a:schemeClr val="dk1"/>
+                          </a:solidFill>
+                          <a:effectLst/>
+                          <a:latin typeface="+mn-lt"/>
+                          <a:ea typeface="+mn-ea"/>
+                          <a:cs typeface="+mn-cs"/>
+                        </a:rPr>
+                        <a:t>14.1 Onderzoek wat is de beste optie app of website.</a:t>
+                      </a:r>
+                    </a:p>
+                    <a:p>
+                      <a:endParaRPr lang="nl-NL" sz="1600" b="1"/>
+                    </a:p>
+                  </a:txBody>
+                  <a:tcPr marL="61529" marR="61529" marT="30765" marB="30765"/>
+                </a:tc>
+                <a:extLst>
+                  <a:ext uri="{0D108BD9-81ED-4DB2-BD59-A6C34878D82A}">
+                    <a16:rowId xmlns:a16="http://schemas.microsoft.com/office/drawing/2014/main" val="3770607082"/>
+                  </a:ext>
+                </a:extLst>
+              </a:tr>
+              <a:tr h="826186">
+                <a:tc>
+                  <a:txBody>
+                    <a:bodyPr/>
+                    <a:lstStyle/>
+                    <a:p>
+                      <a:pPr marL="0" marR="0" lvl="0" indent="0" algn="l" defTabSz="457200" rtl="0" eaLnBrk="1" fontAlgn="auto" latinLnBrk="0" hangingPunct="1">
+                        <a:lnSpc>
+                          <a:spcPct val="100000"/>
+                        </a:lnSpc>
+                        <a:spcBef>
+                          <a:spcPts val="0"/>
+                        </a:spcBef>
+                        <a:spcAft>
+                          <a:spcPts val="0"/>
+                        </a:spcAft>
+                        <a:buClrTx/>
+                        <a:buSzTx/>
+                        <a:buFontTx/>
+                        <a:buNone/>
+                        <a:tabLst/>
+                        <a:defRPr/>
+                      </a:pPr>
+                      <a:r>
+                        <a:rPr lang="en-US" sz="1600" b="1" dirty="0"/>
+                        <a:t>2. </a:t>
+                      </a:r>
+                      <a:r>
+                        <a:rPr lang="nl-NL" sz="1600" b="1" kern="1200" dirty="0">
+                          <a:solidFill>
+                            <a:schemeClr val="dk1"/>
+                          </a:solidFill>
+                          <a:effectLst/>
+                          <a:latin typeface="+mn-lt"/>
+                          <a:ea typeface="+mn-ea"/>
+                          <a:cs typeface="+mn-cs"/>
+                        </a:rPr>
+                        <a:t>Ik wil dat het er een sensor is om de windrichting te kunnen meten zodat ik de data van de windrichting kan krijgen</a:t>
+                      </a:r>
+                      <a:endParaRPr lang="nl-NL" sz="1600" b="1" dirty="0"/>
+                    </a:p>
+                    <a:p>
+                      <a:endParaRPr lang="nl-NL" sz="1600" b="1" dirty="0"/>
+                    </a:p>
+                  </a:txBody>
+                  <a:tcPr marL="61529" marR="61529" marT="30765" marB="30765"/>
+                </a:tc>
+                <a:tc>
+                  <a:txBody>
+                    <a:bodyPr/>
+                    <a:lstStyle/>
+                    <a:p>
+                      <a:pPr marL="0" marR="0" lvl="0" indent="0" algn="l" defTabSz="457200" rtl="0" eaLnBrk="1" fontAlgn="auto" latinLnBrk="0" hangingPunct="1">
+                        <a:lnSpc>
+                          <a:spcPct val="100000"/>
+                        </a:lnSpc>
+                        <a:spcBef>
+                          <a:spcPts val="0"/>
+                        </a:spcBef>
+                        <a:spcAft>
+                          <a:spcPts val="0"/>
+                        </a:spcAft>
+                        <a:buClrTx/>
+                        <a:buSzTx/>
+                        <a:buFontTx/>
+                        <a:buNone/>
+                        <a:tabLst/>
+                        <a:defRPr/>
+                      </a:pPr>
+                      <a:r>
+                        <a:rPr lang="nl-NL" sz="1600" b="1" kern="1200" dirty="0">
+                          <a:solidFill>
+                            <a:schemeClr val="dk1"/>
+                          </a:solidFill>
+                          <a:effectLst/>
+                          <a:latin typeface="+mn-lt"/>
+                          <a:ea typeface="+mn-ea"/>
+                          <a:cs typeface="+mn-cs"/>
+                        </a:rPr>
+                        <a:t>2.4 Kalibeer de windrichting sensor</a:t>
+                      </a:r>
+                      <a:endParaRPr lang="nl-NL" sz="1600" b="1" dirty="0"/>
+                    </a:p>
+                    <a:p>
+                      <a:endParaRPr lang="nl-NL" sz="1600" b="1" dirty="0"/>
+                    </a:p>
+                  </a:txBody>
+                  <a:tcPr marL="61529" marR="61529" marT="30765" marB="30765"/>
+                </a:tc>
+                <a:extLst>
+                  <a:ext uri="{0D108BD9-81ED-4DB2-BD59-A6C34878D82A}">
+                    <a16:rowId xmlns:a16="http://schemas.microsoft.com/office/drawing/2014/main" val="1230054864"/>
+                  </a:ext>
+                </a:extLst>
+              </a:tr>
+              <a:tr h="1064509">
+                <a:tc>
+                  <a:txBody>
+                    <a:bodyPr/>
+                    <a:lstStyle/>
+                    <a:p>
+                      <a:pPr marL="0" marR="0" lvl="0" indent="0" algn="l" defTabSz="457200" rtl="0" eaLnBrk="1" fontAlgn="auto" latinLnBrk="0" hangingPunct="1">
+                        <a:lnSpc>
+                          <a:spcPct val="100000"/>
+                        </a:lnSpc>
+                        <a:spcBef>
+                          <a:spcPts val="0"/>
+                        </a:spcBef>
+                        <a:spcAft>
+                          <a:spcPts val="0"/>
+                        </a:spcAft>
+                        <a:buClrTx/>
+                        <a:buSzTx/>
+                        <a:buFontTx/>
+                        <a:buNone/>
+                        <a:tabLst/>
+                        <a:defRPr/>
+                      </a:pPr>
+                      <a:r>
+                        <a:rPr lang="en-US" sz="1600" b="1" dirty="0"/>
+                        <a:t>1.</a:t>
+                      </a:r>
+                      <a:r>
+                        <a:rPr lang="nl-NL" sz="1600" b="1" kern="1200" dirty="0">
+                          <a:solidFill>
+                            <a:schemeClr val="dk1"/>
+                          </a:solidFill>
+                          <a:effectLst/>
+                          <a:latin typeface="+mn-lt"/>
+                          <a:ea typeface="+mn-ea"/>
+                          <a:cs typeface="+mn-cs"/>
+                        </a:rPr>
+                        <a:t> Ik wil dat er een sensor is die de windsnelheid meet zodat ik de data van de windsnelheid kan krijgen.</a:t>
+                      </a:r>
+                      <a:endParaRPr lang="nl-NL" sz="1600" b="1" dirty="0"/>
+                    </a:p>
+                    <a:p>
+                      <a:endParaRPr lang="nl-NL" sz="1600" b="1" dirty="0"/>
+                    </a:p>
+                  </a:txBody>
+                  <a:tcPr marL="61529" marR="61529" marT="30765" marB="30765"/>
+                </a:tc>
+                <a:tc>
+                  <a:txBody>
+                    <a:bodyPr/>
+                    <a:lstStyle/>
+                    <a:p>
+                      <a:pPr marL="0" marR="0" lvl="0" indent="0" algn="l" defTabSz="457200" rtl="0" eaLnBrk="1" fontAlgn="auto" latinLnBrk="0" hangingPunct="1">
+                        <a:lnSpc>
+                          <a:spcPct val="100000"/>
+                        </a:lnSpc>
+                        <a:spcBef>
+                          <a:spcPts val="0"/>
+                        </a:spcBef>
+                        <a:spcAft>
+                          <a:spcPts val="0"/>
+                        </a:spcAft>
+                        <a:buClrTx/>
+                        <a:buSzTx/>
+                        <a:buFontTx/>
+                        <a:buNone/>
+                        <a:tabLst/>
+                        <a:defRPr/>
+                      </a:pPr>
+                      <a:r>
+                        <a:rPr lang="nl-NL" sz="1600" b="1" kern="1200" dirty="0">
+                          <a:solidFill>
+                            <a:schemeClr val="dk1"/>
+                          </a:solidFill>
+                          <a:effectLst/>
+                          <a:latin typeface="+mn-lt"/>
+                          <a:ea typeface="+mn-ea"/>
+                          <a:cs typeface="+mn-cs"/>
+                        </a:rPr>
+                        <a:t>1.4 Kalibreer de windsnelheid sensor.</a:t>
+                      </a:r>
+                      <a:endParaRPr lang="nl-NL" sz="1600" b="1" dirty="0"/>
+                    </a:p>
+                    <a:p>
+                      <a:pPr marL="0" marR="0" lvl="0" indent="0" algn="l" defTabSz="457200" rtl="0" eaLnBrk="1" fontAlgn="auto" latinLnBrk="0" hangingPunct="1">
+                        <a:lnSpc>
+                          <a:spcPct val="100000"/>
+                        </a:lnSpc>
+                        <a:spcBef>
+                          <a:spcPts val="0"/>
+                        </a:spcBef>
+                        <a:spcAft>
+                          <a:spcPts val="0"/>
+                        </a:spcAft>
+                        <a:buClrTx/>
+                        <a:buSzTx/>
+                        <a:buFontTx/>
+                        <a:buNone/>
+                        <a:tabLst/>
+                        <a:defRPr/>
+                      </a:pPr>
+                      <a:endParaRPr lang="nl-NL" sz="1600" b="1" kern="1200" dirty="0">
+                        <a:solidFill>
+                          <a:schemeClr val="dk1"/>
+                        </a:solidFill>
+                        <a:effectLst/>
+                        <a:latin typeface="+mn-lt"/>
+                        <a:ea typeface="+mn-ea"/>
+                        <a:cs typeface="+mn-cs"/>
+                      </a:endParaRPr>
+                    </a:p>
+                    <a:p>
+                      <a:endParaRPr lang="nl-NL" sz="1600" b="1" dirty="0"/>
+                    </a:p>
+                  </a:txBody>
+                  <a:tcPr marL="61529" marR="61529" marT="30765" marB="30765"/>
+                </a:tc>
+                <a:extLst>
+                  <a:ext uri="{0D108BD9-81ED-4DB2-BD59-A6C34878D82A}">
+                    <a16:rowId xmlns:a16="http://schemas.microsoft.com/office/drawing/2014/main" val="1872891904"/>
+                  </a:ext>
+                </a:extLst>
+              </a:tr>
+            </a:tbl>
+          </a:graphicData>
+        </a:graphic>
+      </p:graphicFrame>
     </p:spTree>
     <p:extLst>
       <p:ext uri="{BB962C8B-B14F-4D97-AF65-F5344CB8AC3E}">
@@ -6825,7 +8383,7 @@
 </p:sld>
 </file>
 
-<file path=ppt/slides/slide6.xml><?xml version="1.0" encoding="utf-8"?>
+<file path=ppt/slides/slide7.xml><?xml version="1.0" encoding="utf-8"?>
 <p:sld xmlns:a="http://schemas.openxmlformats.org/drawingml/2006/main" xmlns:r="http://schemas.openxmlformats.org/officeDocument/2006/relationships" xmlns:p="http://schemas.openxmlformats.org/presentationml/2006/main">
   <p:cSld>
     <p:spTree>

</xml_diff>